<commit_message>
Pre-presentation chages, added the braid_examples.tl file
</commit_message>
<xml_diff>
--- a/payette_2024_braid.pptx
+++ b/payette_2024_braid.pptx
@@ -8,10 +8,10 @@
     <p:sldMasterId id="2147483684" r:id="rId7"/>
   </p:sldMasterIdLst>
   <p:notesMasterIdLst>
-    <p:notesMasterId r:id="rId18"/>
+    <p:notesMasterId r:id="rId22"/>
   </p:notesMasterIdLst>
   <p:handoutMasterIdLst>
-    <p:handoutMasterId r:id="rId19"/>
+    <p:handoutMasterId r:id="rId23"/>
   </p:handoutMasterIdLst>
   <p:sldIdLst>
     <p:sldId id="272" r:id="rId8"/>
@@ -22,8 +22,12 @@
     <p:sldId id="261" r:id="rId13"/>
     <p:sldId id="267" r:id="rId14"/>
     <p:sldId id="260" r:id="rId15"/>
-    <p:sldId id="264" r:id="rId16"/>
-    <p:sldId id="265" r:id="rId17"/>
+    <p:sldId id="274" r:id="rId16"/>
+    <p:sldId id="275" r:id="rId17"/>
+    <p:sldId id="277" r:id="rId18"/>
+    <p:sldId id="264" r:id="rId19"/>
+    <p:sldId id="276" r:id="rId20"/>
+    <p:sldId id="265" r:id="rId21"/>
   </p:sldIdLst>
   <p:sldSz cx="12192000" cy="6858000"/>
   <p:notesSz cx="6858000" cy="9144000"/>
@@ -139,7 +143,11 @@
             <p14:sldId id="261"/>
             <p14:sldId id="267"/>
             <p14:sldId id="260"/>
+            <p14:sldId id="274"/>
+            <p14:sldId id="275"/>
+            <p14:sldId id="277"/>
             <p14:sldId id="264"/>
+            <p14:sldId id="276"/>
             <p14:sldId id="265"/>
           </p14:sldIdLst>
         </p14:section>
@@ -257,7 +265,7 @@
           <a:p>
             <a:fld id="{69440670-43D7-400A-ABC5-B69E064DBB37}" type="datetimeFigureOut">
               <a:rPr lang="en-GB" smtClean="0"/>
-              <a:t>17/06/2024</a:t>
+              <a:t>25/06/2024</a:t>
             </a:fld>
             <a:endParaRPr lang="en-GB"/>
           </a:p>
@@ -434,7 +442,7 @@
           <a:p>
             <a:fld id="{611B03A4-75C9-4E3D-9183-2102CA9AEC33}" type="datetimeFigureOut">
               <a:rPr lang="en-GB" smtClean="0"/>
-              <a:t>17/06/2024</a:t>
+              <a:t>25/06/2024</a:t>
             </a:fld>
             <a:endParaRPr lang="en-GB"/>
           </a:p>
@@ -5273,7 +5281,16 @@
                 <a:latin typeface="Segoe UI Light" panose="020B0502040204020203" pitchFamily="34" charset="0"/>
                 <a:cs typeface="Segoe UI Light" panose="020B0502040204020203" pitchFamily="34" charset="0"/>
               </a:rPr>
-              <a:t> Up:</a:t>
+              <a:t> Up: </a:t>
+            </a:r>
+            <a:r>
+              <a:rPr lang="en-US" sz="6000" b="1" dirty="0">
+                <a:solidFill>
+                  <a:srgbClr val="346296"/>
+                </a:solidFill>
+                <a:latin typeface="+mn-lt"/>
+              </a:rPr>
+              <a:t>Braid: One Year In</a:t>
             </a:r>
             <a:endParaRPr lang="en-DE" sz="6000" b="1" dirty="0">
               <a:solidFill>
@@ -5299,6 +5316,732 @@
 </file>
 
 <file path=ppt/slides/slide10.xml><?xml version="1.0" encoding="utf-8"?>
+<p:sld xmlns:a="http://schemas.openxmlformats.org/drawingml/2006/main" xmlns:r="http://schemas.openxmlformats.org/officeDocument/2006/relationships" xmlns:p="http://schemas.openxmlformats.org/presentationml/2006/main">
+  <p:cSld>
+    <p:spTree>
+      <p:nvGrpSpPr>
+        <p:cNvPr id="1" name=""/>
+        <p:cNvGrpSpPr/>
+        <p:nvPr/>
+      </p:nvGrpSpPr>
+      <p:grpSpPr>
+        <a:xfrm>
+          <a:off x="0" y="0"/>
+          <a:ext cx="0" cy="0"/>
+          <a:chOff x="0" y="0"/>
+          <a:chExt cx="0" cy="0"/>
+        </a:xfrm>
+      </p:grpSpPr>
+      <p:sp>
+        <p:nvSpPr>
+          <p:cNvPr id="2" name="Titre 1">
+            <a:extLst>
+              <a:ext uri="{FF2B5EF4-FFF2-40B4-BE49-F238E27FC236}">
+                <a16:creationId xmlns:a16="http://schemas.microsoft.com/office/drawing/2014/main" id="{5191E0F2-FE77-51ED-3F72-223B58926E74}"/>
+              </a:ext>
+            </a:extLst>
+          </p:cNvPr>
+          <p:cNvSpPr>
+            <a:spLocks noGrp="1"/>
+          </p:cNvSpPr>
+          <p:nvPr>
+            <p:ph type="title"/>
+          </p:nvPr>
+        </p:nvSpPr>
+        <p:spPr/>
+        <p:txBody>
+          <a:bodyPr/>
+          <a:lstStyle/>
+          <a:p>
+            <a:r>
+              <a:rPr lang="fr-FR" dirty="0" err="1"/>
+              <a:t>Status</a:t>
+            </a:r>
+            <a:r>
+              <a:rPr lang="fr-FR" dirty="0"/>
+              <a:t> 2024</a:t>
+            </a:r>
+            <a:endParaRPr lang="en-GB" dirty="0"/>
+          </a:p>
+        </p:txBody>
+      </p:sp>
+      <p:sp>
+        <p:nvSpPr>
+          <p:cNvPr id="3" name="Espace réservé du contenu 2">
+            <a:extLst>
+              <a:ext uri="{FF2B5EF4-FFF2-40B4-BE49-F238E27FC236}">
+                <a16:creationId xmlns:a16="http://schemas.microsoft.com/office/drawing/2014/main" id="{07D5023A-BA6F-B725-CF78-FD889E577EA6}"/>
+              </a:ext>
+            </a:extLst>
+          </p:cNvPr>
+          <p:cNvSpPr>
+            <a:spLocks noGrp="1"/>
+          </p:cNvSpPr>
+          <p:nvPr>
+            <p:ph idx="1"/>
+          </p:nvPr>
+        </p:nvSpPr>
+        <p:spPr/>
+        <p:txBody>
+          <a:bodyPr/>
+          <a:lstStyle/>
+          <a:p>
+            <a:r>
+              <a:rPr lang="en-US" dirty="0"/>
+              <a:t>Validated runtime semantics</a:t>
+            </a:r>
+          </a:p>
+          <a:p>
+            <a:pPr lvl="1"/>
+            <a:r>
+              <a:rPr lang="en-US" dirty="0"/>
+              <a:t>Explored many functional scenarios</a:t>
+            </a:r>
+          </a:p>
+          <a:p>
+            <a:r>
+              <a:rPr lang="en-US" dirty="0"/>
+              <a:t> Number of users: </a:t>
+            </a:r>
+            <a:r>
+              <a:rPr lang="en-US" dirty="0">
+                <a:solidFill>
+                  <a:srgbClr val="C00000"/>
+                </a:solidFill>
+              </a:rPr>
+              <a:t>1.5</a:t>
+            </a:r>
+          </a:p>
+          <a:p>
+            <a:r>
+              <a:rPr lang="en-US" dirty="0"/>
+              <a:t>Have a PR for a ci/cd setup</a:t>
+            </a:r>
+          </a:p>
+          <a:p>
+            <a:r>
+              <a:rPr lang="en-US" dirty="0"/>
+              <a:t>Once the ci/cd pipeline we will have binary releases</a:t>
+            </a:r>
+          </a:p>
+          <a:p>
+            <a:r>
+              <a:rPr lang="en-US" dirty="0"/>
+              <a:t>Still no high-level documentation</a:t>
+            </a:r>
+          </a:p>
+          <a:p>
+            <a:pPr lvl="1"/>
+            <a:r>
+              <a:rPr lang="en-US" dirty="0"/>
+              <a:t>There’s so much to document!</a:t>
+            </a:r>
+          </a:p>
+        </p:txBody>
+      </p:sp>
+    </p:spTree>
+    <p:extLst>
+      <p:ext uri="{BB962C8B-B14F-4D97-AF65-F5344CB8AC3E}">
+        <p14:creationId xmlns:p14="http://schemas.microsoft.com/office/powerpoint/2010/main" val="378805224"/>
+      </p:ext>
+    </p:extLst>
+  </p:cSld>
+  <p:clrMapOvr>
+    <a:masterClrMapping/>
+  </p:clrMapOvr>
+</p:sld>
+</file>
+
+<file path=ppt/slides/slide11.xml><?xml version="1.0" encoding="utf-8"?>
+<p:sld xmlns:a="http://schemas.openxmlformats.org/drawingml/2006/main" xmlns:r="http://schemas.openxmlformats.org/officeDocument/2006/relationships" xmlns:p="http://schemas.openxmlformats.org/presentationml/2006/main">
+  <p:cSld>
+    <p:spTree>
+      <p:nvGrpSpPr>
+        <p:cNvPr id="1" name=""/>
+        <p:cNvGrpSpPr/>
+        <p:nvPr/>
+      </p:nvGrpSpPr>
+      <p:grpSpPr>
+        <a:xfrm>
+          <a:off x="0" y="0"/>
+          <a:ext cx="0" cy="0"/>
+          <a:chOff x="0" y="0"/>
+          <a:chExt cx="0" cy="0"/>
+        </a:xfrm>
+      </p:grpSpPr>
+      <p:sp>
+        <p:nvSpPr>
+          <p:cNvPr id="2" name="Title 1">
+            <a:extLst>
+              <a:ext uri="{FF2B5EF4-FFF2-40B4-BE49-F238E27FC236}">
+                <a16:creationId xmlns:a16="http://schemas.microsoft.com/office/drawing/2014/main" id="{AD0B4C2D-F36A-3132-DE9B-92FA6B46F308}"/>
+              </a:ext>
+            </a:extLst>
+          </p:cNvPr>
+          <p:cNvSpPr>
+            <a:spLocks noGrp="1"/>
+          </p:cNvSpPr>
+          <p:nvPr>
+            <p:ph type="title"/>
+          </p:nvPr>
+        </p:nvSpPr>
+        <p:spPr/>
+        <p:txBody>
+          <a:bodyPr/>
+          <a:lstStyle/>
+          <a:p>
+            <a:r>
+              <a:rPr lang="en-US" dirty="0"/>
+              <a:t>Braid Basics</a:t>
+            </a:r>
+          </a:p>
+        </p:txBody>
+      </p:sp>
+      <p:sp>
+        <p:nvSpPr>
+          <p:cNvPr id="3" name="Content Placeholder 2">
+            <a:extLst>
+              <a:ext uri="{FF2B5EF4-FFF2-40B4-BE49-F238E27FC236}">
+                <a16:creationId xmlns:a16="http://schemas.microsoft.com/office/drawing/2014/main" id="{10EAFC8D-0AFC-5604-FCF4-CDDCCF637F2C}"/>
+              </a:ext>
+            </a:extLst>
+          </p:cNvPr>
+          <p:cNvSpPr>
+            <a:spLocks noGrp="1"/>
+          </p:cNvSpPr>
+          <p:nvPr>
+            <p:ph idx="1"/>
+          </p:nvPr>
+        </p:nvSpPr>
+        <p:spPr>
+          <a:xfrm>
+            <a:off x="838200" y="1395248"/>
+            <a:ext cx="10515600" cy="5097627"/>
+          </a:xfrm>
+        </p:spPr>
+        <p:txBody>
+          <a:bodyPr>
+            <a:normAutofit fontScale="92500" lnSpcReduction="20000"/>
+          </a:bodyPr>
+          <a:lstStyle/>
+          <a:p>
+            <a:r>
+              <a:rPr lang="en-US" dirty="0"/>
+              <a:t>Minimal “language”</a:t>
+            </a:r>
+          </a:p>
+          <a:p>
+            <a:pPr lvl="1"/>
+            <a:r>
+              <a:rPr lang="en-US" dirty="0"/>
+              <a:t>No expression-mode. Only command mode. No keywords, no operators, only functions)</a:t>
+            </a:r>
+          </a:p>
+          <a:p>
+            <a:pPr lvl="2"/>
+            <a:r>
+              <a:rPr lang="en-US" dirty="0"/>
+              <a:t>So yes – it is a LISP </a:t>
+            </a:r>
+            <a:r>
+              <a:rPr lang="en-US" dirty="0" err="1"/>
+              <a:t>varient</a:t>
+            </a:r>
+            <a:endParaRPr lang="en-US" dirty="0"/>
+          </a:p>
+          <a:p>
+            <a:pPr lvl="1"/>
+            <a:r>
+              <a:rPr lang="en-US" dirty="0"/>
+              <a:t>Syntax</a:t>
+            </a:r>
+          </a:p>
+          <a:p>
+            <a:pPr marL="914400" lvl="2" indent="0">
+              <a:buNone/>
+            </a:pPr>
+            <a:r>
+              <a:rPr lang="en-US" sz="2400" dirty="0">
+                <a:latin typeface="Cascadia Code" panose="020B0609020000020004" pitchFamily="49" charset="0"/>
+                <a:cs typeface="Cascadia Code" panose="020B0609020000020004" pitchFamily="49" charset="0"/>
+              </a:rPr>
+              <a:t>(</a:t>
+            </a:r>
+            <a:r>
+              <a:rPr lang="en-US" sz="2400" dirty="0" err="1">
+                <a:latin typeface="Cascadia Code" panose="020B0609020000020004" pitchFamily="49" charset="0"/>
+                <a:cs typeface="Cascadia Code" panose="020B0609020000020004" pitchFamily="49" charset="0"/>
+              </a:rPr>
+              <a:t>println</a:t>
+            </a:r>
+            <a:r>
+              <a:rPr lang="en-US" sz="2400" dirty="0">
+                <a:latin typeface="Cascadia Code" panose="020B0609020000020004" pitchFamily="49" charset="0"/>
+                <a:cs typeface="Cascadia Code" panose="020B0609020000020004" pitchFamily="49" charset="0"/>
+              </a:rPr>
+              <a:t> “The sum is” (+ 2 3)       “so there”)</a:t>
+            </a:r>
+          </a:p>
+          <a:p>
+            <a:pPr marL="914400" lvl="2" indent="0">
+              <a:buNone/>
+            </a:pPr>
+            <a:r>
+              <a:rPr lang="en-US" sz="2400" dirty="0">
+                <a:latin typeface="Cascadia Code" panose="020B0609020000020004" pitchFamily="49" charset="0"/>
+                <a:cs typeface="Cascadia Code" panose="020B0609020000020004" pitchFamily="49" charset="0"/>
+              </a:rPr>
+              <a:t>(</a:t>
+            </a:r>
+            <a:r>
+              <a:rPr lang="en-US" sz="2400" i="1" dirty="0">
+                <a:latin typeface="Cascadia Code" panose="020B0609020000020004" pitchFamily="49" charset="0"/>
+                <a:cs typeface="Cascadia Code" panose="020B0609020000020004" pitchFamily="49" charset="0"/>
+              </a:rPr>
+              <a:t>function arg1        (nested call) arg3)            </a:t>
+            </a:r>
+          </a:p>
+          <a:p>
+            <a:r>
+              <a:rPr lang="en-US" dirty="0"/>
+              <a:t>Essentially a LISP </a:t>
+            </a:r>
+            <a:r>
+              <a:rPr lang="en-US" dirty="0" err="1"/>
+              <a:t>varient</a:t>
+            </a:r>
+            <a:endParaRPr lang="en-US" dirty="0"/>
+          </a:p>
+          <a:p>
+            <a:r>
+              <a:rPr lang="en-US" dirty="0"/>
+              <a:t>Lexically scoped with closures</a:t>
+            </a:r>
+          </a:p>
+          <a:p>
+            <a:r>
+              <a:rPr lang="en-US" dirty="0"/>
+              <a:t>Macros (e.g. for loop)</a:t>
+            </a:r>
+          </a:p>
+          <a:p>
+            <a:r>
+              <a:rPr lang="en-US" dirty="0"/>
+              <a:t>Mix of lazy and strict semantics (perf, experience)</a:t>
+            </a:r>
+          </a:p>
+          <a:p>
+            <a:r>
+              <a:rPr lang="en-US" dirty="0"/>
+              <a:t>Internally uses slices for deconstructing list (perf)</a:t>
+            </a:r>
+          </a:p>
+        </p:txBody>
+      </p:sp>
+    </p:spTree>
+    <p:extLst>
+      <p:ext uri="{BB962C8B-B14F-4D97-AF65-F5344CB8AC3E}">
+        <p14:creationId xmlns:p14="http://schemas.microsoft.com/office/powerpoint/2010/main" val="776108455"/>
+      </p:ext>
+    </p:extLst>
+  </p:cSld>
+  <p:clrMapOvr>
+    <a:masterClrMapping/>
+  </p:clrMapOvr>
+</p:sld>
+</file>
+
+<file path=ppt/slides/slide12.xml><?xml version="1.0" encoding="utf-8"?>
+<p:sld xmlns:a="http://schemas.openxmlformats.org/drawingml/2006/main" xmlns:r="http://schemas.openxmlformats.org/officeDocument/2006/relationships" xmlns:p="http://schemas.openxmlformats.org/presentationml/2006/main">
+  <p:cSld>
+    <p:spTree>
+      <p:nvGrpSpPr>
+        <p:cNvPr id="1" name=""/>
+        <p:cNvGrpSpPr/>
+        <p:nvPr/>
+      </p:nvGrpSpPr>
+      <p:grpSpPr>
+        <a:xfrm>
+          <a:off x="0" y="0"/>
+          <a:ext cx="0" cy="0"/>
+          <a:chOff x="0" y="0"/>
+          <a:chExt cx="0" cy="0"/>
+        </a:xfrm>
+      </p:grpSpPr>
+      <p:sp>
+        <p:nvSpPr>
+          <p:cNvPr id="4" name="Title 3">
+            <a:extLst>
+              <a:ext uri="{FF2B5EF4-FFF2-40B4-BE49-F238E27FC236}">
+                <a16:creationId xmlns:a16="http://schemas.microsoft.com/office/drawing/2014/main" id="{2B167248-C99C-E892-89E1-4CBB81F02F90}"/>
+              </a:ext>
+            </a:extLst>
+          </p:cNvPr>
+          <p:cNvSpPr>
+            <a:spLocks noGrp="1"/>
+          </p:cNvSpPr>
+          <p:nvPr>
+            <p:ph type="title"/>
+          </p:nvPr>
+        </p:nvSpPr>
+        <p:spPr>
+          <a:xfrm>
+            <a:off x="831850" y="529389"/>
+            <a:ext cx="10515600" cy="1004637"/>
+          </a:xfrm>
+        </p:spPr>
+        <p:txBody>
+          <a:bodyPr/>
+          <a:lstStyle/>
+          <a:p>
+            <a:r>
+              <a:rPr lang="en-GB"/>
+              <a:t>Demos</a:t>
+            </a:r>
+          </a:p>
+        </p:txBody>
+      </p:sp>
+      <p:sp>
+        <p:nvSpPr>
+          <p:cNvPr id="5" name="Text Placeholder 4">
+            <a:extLst>
+              <a:ext uri="{FF2B5EF4-FFF2-40B4-BE49-F238E27FC236}">
+                <a16:creationId xmlns:a16="http://schemas.microsoft.com/office/drawing/2014/main" id="{2CACAFC7-78CB-98F9-FEF3-D3E8C9FF6E6F}"/>
+              </a:ext>
+            </a:extLst>
+          </p:cNvPr>
+          <p:cNvSpPr>
+            <a:spLocks noGrp="1"/>
+          </p:cNvSpPr>
+          <p:nvPr>
+            <p:ph type="body" idx="1"/>
+          </p:nvPr>
+        </p:nvSpPr>
+        <p:spPr>
+          <a:xfrm>
+            <a:off x="831850" y="1653758"/>
+            <a:ext cx="10515600" cy="1500187"/>
+          </a:xfrm>
+        </p:spPr>
+        <p:txBody>
+          <a:bodyPr/>
+          <a:lstStyle/>
+          <a:p>
+            <a:r>
+              <a:rPr lang="en-GB"/>
+              <a:t>We love Demos!</a:t>
+            </a:r>
+          </a:p>
+        </p:txBody>
+      </p:sp>
+      <p:pic>
+        <p:nvPicPr>
+          <p:cNvPr id="9" name="Picture 9">
+            <a:extLst>
+              <a:ext uri="{FF2B5EF4-FFF2-40B4-BE49-F238E27FC236}">
+                <a16:creationId xmlns:a16="http://schemas.microsoft.com/office/drawing/2014/main" id="{776AC288-703A-8014-23CA-E040CDD7E976}"/>
+              </a:ext>
+            </a:extLst>
+          </p:cNvPr>
+          <p:cNvPicPr>
+            <a:picLocks noChangeAspect="1"/>
+          </p:cNvPicPr>
+          <p:nvPr/>
+        </p:nvPicPr>
+        <p:blipFill>
+          <a:blip r:embed="rId2"/>
+          <a:stretch>
+            <a:fillRect/>
+          </a:stretch>
+        </p:blipFill>
+        <p:spPr>
+          <a:xfrm>
+            <a:off x="3404191" y="615392"/>
+            <a:ext cx="6127897" cy="5060147"/>
+          </a:xfrm>
+          <a:prstGeom prst="rect">
+            <a:avLst/>
+          </a:prstGeom>
+          <a:ln>
+            <a:noFill/>
+          </a:ln>
+          <a:effectLst>
+            <a:outerShdw blurRad="292100" dist="139700" dir="2700000" algn="tl" rotWithShape="0">
+              <a:srgbClr val="333333">
+                <a:alpha val="65000"/>
+              </a:srgbClr>
+            </a:outerShdw>
+          </a:effectLst>
+        </p:spPr>
+      </p:pic>
+    </p:spTree>
+    <p:extLst>
+      <p:ext uri="{BB962C8B-B14F-4D97-AF65-F5344CB8AC3E}">
+        <p14:creationId xmlns:p14="http://schemas.microsoft.com/office/powerpoint/2010/main" val="3317259441"/>
+      </p:ext>
+    </p:extLst>
+  </p:cSld>
+  <p:clrMapOvr>
+    <a:masterClrMapping/>
+  </p:clrMapOvr>
+</p:sld>
+</file>
+
+<file path=ppt/slides/slide13.xml><?xml version="1.0" encoding="utf-8"?>
+<p:sld xmlns:a="http://schemas.openxmlformats.org/drawingml/2006/main" xmlns:r="http://schemas.openxmlformats.org/officeDocument/2006/relationships" xmlns:p="http://schemas.openxmlformats.org/presentationml/2006/main">
+  <p:cSld>
+    <p:spTree>
+      <p:nvGrpSpPr>
+        <p:cNvPr id="1" name=""/>
+        <p:cNvGrpSpPr/>
+        <p:nvPr/>
+      </p:nvGrpSpPr>
+      <p:grpSpPr>
+        <a:xfrm>
+          <a:off x="0" y="0"/>
+          <a:ext cx="0" cy="0"/>
+          <a:chOff x="0" y="0"/>
+          <a:chExt cx="0" cy="0"/>
+        </a:xfrm>
+      </p:grpSpPr>
+      <p:sp>
+        <p:nvSpPr>
+          <p:cNvPr id="2" name="Titre 1">
+            <a:extLst>
+              <a:ext uri="{FF2B5EF4-FFF2-40B4-BE49-F238E27FC236}">
+                <a16:creationId xmlns:a16="http://schemas.microsoft.com/office/drawing/2014/main" id="{5191E0F2-FE77-51ED-3F72-223B58926E74}"/>
+              </a:ext>
+            </a:extLst>
+          </p:cNvPr>
+          <p:cNvSpPr>
+            <a:spLocks noGrp="1"/>
+          </p:cNvSpPr>
+          <p:nvPr>
+            <p:ph type="title"/>
+          </p:nvPr>
+        </p:nvSpPr>
+        <p:spPr/>
+        <p:txBody>
+          <a:bodyPr/>
+          <a:lstStyle/>
+          <a:p>
+            <a:r>
+              <a:rPr lang="fr-FR" dirty="0" err="1"/>
+              <a:t>Some</a:t>
+            </a:r>
+            <a:r>
+              <a:rPr lang="fr-FR" dirty="0"/>
+              <a:t> </a:t>
+            </a:r>
+            <a:r>
+              <a:rPr lang="fr-FR" dirty="0" err="1"/>
+              <a:t>Enhancements</a:t>
+            </a:r>
+            <a:endParaRPr lang="en-GB" dirty="0"/>
+          </a:p>
+        </p:txBody>
+      </p:sp>
+      <p:sp>
+        <p:nvSpPr>
+          <p:cNvPr id="3" name="Espace réservé du contenu 2">
+            <a:extLst>
+              <a:ext uri="{FF2B5EF4-FFF2-40B4-BE49-F238E27FC236}">
+                <a16:creationId xmlns:a16="http://schemas.microsoft.com/office/drawing/2014/main" id="{07D5023A-BA6F-B725-CF78-FD889E577EA6}"/>
+              </a:ext>
+            </a:extLst>
+          </p:cNvPr>
+          <p:cNvSpPr>
+            <a:spLocks noGrp="1"/>
+          </p:cNvSpPr>
+          <p:nvPr>
+            <p:ph idx="1"/>
+          </p:nvPr>
+        </p:nvSpPr>
+        <p:spPr/>
+        <p:txBody>
+          <a:bodyPr>
+            <a:normAutofit fontScale="92500"/>
+          </a:bodyPr>
+          <a:lstStyle/>
+          <a:p>
+            <a:r>
+              <a:rPr lang="en-US" dirty="0"/>
+              <a:t>Can use a dictionary in assignments</a:t>
+            </a:r>
+          </a:p>
+          <a:p>
+            <a:pPr marL="457200" lvl="1" indent="0">
+              <a:buNone/>
+            </a:pPr>
+            <a:r>
+              <a:rPr lang="en-US" sz="2600" dirty="0">
+                <a:latin typeface="Cascadia Code" panose="020B0609020000020004" pitchFamily="49" charset="0"/>
+                <a:cs typeface="Cascadia Code" panose="020B0609020000020004" pitchFamily="49" charset="0"/>
+              </a:rPr>
+              <a:t>(let { “extension” “txt” “length </a:t>
+            </a:r>
+            <a:r>
+              <a:rPr lang="en-US" sz="2600" dirty="0" err="1">
+                <a:latin typeface="Cascadia Code" panose="020B0609020000020004" pitchFamily="49" charset="0"/>
+                <a:cs typeface="Cascadia Code" panose="020B0609020000020004" pitchFamily="49" charset="0"/>
+              </a:rPr>
+              <a:t>len</a:t>
+            </a:r>
+            <a:r>
+              <a:rPr lang="en-US" sz="2600" dirty="0">
+                <a:latin typeface="Cascadia Code" panose="020B0609020000020004" pitchFamily="49" charset="0"/>
+                <a:cs typeface="Cascadia Code" panose="020B0609020000020004" pitchFamily="49" charset="0"/>
+              </a:rPr>
+              <a:t>} (ls | !! 1))</a:t>
+            </a:r>
+          </a:p>
+          <a:p>
+            <a:r>
+              <a:rPr lang="en-US" sz="3000" dirty="0">
+                <a:latin typeface="Cascadia Code" panose="020B0609020000020004" pitchFamily="49" charset="0"/>
+                <a:cs typeface="Cascadia Code" panose="020B0609020000020004" pitchFamily="49" charset="0"/>
+              </a:rPr>
+              <a:t>with</a:t>
+            </a:r>
+            <a:r>
+              <a:rPr lang="en-US" dirty="0"/>
+              <a:t> function</a:t>
+            </a:r>
+          </a:p>
+          <a:p>
+            <a:pPr marL="457200" lvl="1" indent="0">
+              <a:buNone/>
+            </a:pPr>
+            <a:r>
+              <a:rPr lang="en-US" dirty="0"/>
+              <a:t>(</a:t>
+            </a:r>
+            <a:r>
+              <a:rPr lang="en-US" sz="2400" dirty="0">
+                <a:latin typeface="Cascadia Code" panose="020B0609020000020004" pitchFamily="49" charset="0"/>
+                <a:cs typeface="Cascadia Code" panose="020B0609020000020004" pitchFamily="49" charset="0"/>
+              </a:rPr>
+              <a:t>with [x 1 y 2] (</a:t>
+            </a:r>
+            <a:r>
+              <a:rPr lang="en-US" sz="2400" dirty="0" err="1">
+                <a:latin typeface="Cascadia Code" panose="020B0609020000020004" pitchFamily="49" charset="0"/>
+                <a:cs typeface="Cascadia Code" panose="020B0609020000020004" pitchFamily="49" charset="0"/>
+              </a:rPr>
+              <a:t>println</a:t>
+            </a:r>
+            <a:r>
+              <a:rPr lang="en-US" sz="2400" dirty="0">
+                <a:latin typeface="Cascadia Code" panose="020B0609020000020004" pitchFamily="49" charset="0"/>
+                <a:cs typeface="Cascadia Code" panose="020B0609020000020004" pitchFamily="49" charset="0"/>
+              </a:rPr>
+              <a:t> “Hi”) (+ x y))</a:t>
+            </a:r>
+          </a:p>
+          <a:p>
+            <a:r>
+              <a:rPr lang="en-US" dirty="0"/>
+              <a:t>Dictionary in </a:t>
+            </a:r>
+            <a:r>
+              <a:rPr lang="en-US" sz="2800" dirty="0">
+                <a:latin typeface="Cascadia Code" panose="020B0609020000020004" pitchFamily="49" charset="0"/>
+                <a:cs typeface="Cascadia Code" panose="020B0609020000020004" pitchFamily="49" charset="0"/>
+              </a:rPr>
+              <a:t>foreach</a:t>
+            </a:r>
+            <a:r>
+              <a:rPr lang="en-US" dirty="0"/>
+              <a:t> loop</a:t>
+            </a:r>
+          </a:p>
+          <a:p>
+            <a:pPr marL="457200" lvl="1" indent="0">
+              <a:buNone/>
+            </a:pPr>
+            <a:r>
+              <a:rPr lang="en-US" sz="2600" dirty="0">
+                <a:latin typeface="Cascadia Code" panose="020B0609020000020004" pitchFamily="49" charset="0"/>
+                <a:cs typeface="Cascadia Code" panose="020B0609020000020004" pitchFamily="49" charset="0"/>
+              </a:rPr>
+              <a:t>(foreach {"extension" #"text" "length" </a:t>
+            </a:r>
+            <a:r>
+              <a:rPr lang="en-US" sz="2600" dirty="0" err="1">
+                <a:latin typeface="Cascadia Code" panose="020B0609020000020004" pitchFamily="49" charset="0"/>
+                <a:cs typeface="Cascadia Code" panose="020B0609020000020004" pitchFamily="49" charset="0"/>
+              </a:rPr>
+              <a:t>len</a:t>
+            </a:r>
+            <a:r>
+              <a:rPr lang="en-US" sz="2600" dirty="0">
+                <a:latin typeface="Cascadia Code" panose="020B0609020000020004" pitchFamily="49" charset="0"/>
+                <a:cs typeface="Cascadia Code" panose="020B0609020000020004" pitchFamily="49" charset="0"/>
+              </a:rPr>
+              <a:t>} (ls)</a:t>
+            </a:r>
+          </a:p>
+          <a:p>
+            <a:pPr marL="457200" lvl="1" indent="0">
+              <a:buNone/>
+            </a:pPr>
+            <a:r>
+              <a:rPr lang="en-US" sz="2600" dirty="0">
+                <a:latin typeface="Cascadia Code" panose="020B0609020000020004" pitchFamily="49" charset="0"/>
+                <a:cs typeface="Cascadia Code" panose="020B0609020000020004" pitchFamily="49" charset="0"/>
+              </a:rPr>
+              <a:t>    (print </a:t>
+            </a:r>
+            <a:r>
+              <a:rPr lang="en-US" sz="2600" dirty="0" err="1">
+                <a:latin typeface="Cascadia Code" panose="020B0609020000020004" pitchFamily="49" charset="0"/>
+                <a:cs typeface="Cascadia Code" panose="020B0609020000020004" pitchFamily="49" charset="0"/>
+              </a:rPr>
+              <a:t>len</a:t>
+            </a:r>
+            <a:r>
+              <a:rPr lang="en-US" sz="2600" dirty="0">
+                <a:latin typeface="Cascadia Code" panose="020B0609020000020004" pitchFamily="49" charset="0"/>
+                <a:cs typeface="Cascadia Code" panose="020B0609020000020004" pitchFamily="49" charset="0"/>
+              </a:rPr>
+              <a:t>)</a:t>
+            </a:r>
+          </a:p>
+          <a:p>
+            <a:pPr marL="457200" lvl="1" indent="0">
+              <a:buNone/>
+            </a:pPr>
+            <a:r>
+              <a:rPr lang="en-US" sz="2600" dirty="0">
+                <a:latin typeface="Cascadia Code" panose="020B0609020000020004" pitchFamily="49" charset="0"/>
+                <a:cs typeface="Cascadia Code" panose="020B0609020000020004" pitchFamily="49" charset="0"/>
+              </a:rPr>
+              <a:t>)</a:t>
+            </a:r>
+            <a:endParaRPr lang="en-US" dirty="0"/>
+          </a:p>
+          <a:p>
+            <a:r>
+              <a:rPr lang="en-US" dirty="0"/>
+              <a:t>Also some new functions, bug fixes, some performance for</a:t>
+            </a:r>
+          </a:p>
+        </p:txBody>
+      </p:sp>
+    </p:spTree>
+    <p:extLst>
+      <p:ext uri="{BB962C8B-B14F-4D97-AF65-F5344CB8AC3E}">
+        <p14:creationId xmlns:p14="http://schemas.microsoft.com/office/powerpoint/2010/main" val="1460595302"/>
+      </p:ext>
+    </p:extLst>
+  </p:cSld>
+  <p:clrMapOvr>
+    <a:masterClrMapping/>
+  </p:clrMapOvr>
+</p:sld>
+</file>
+
+<file path=ppt/slides/slide14.xml><?xml version="1.0" encoding="utf-8"?>
 <p:sld xmlns:a="http://schemas.openxmlformats.org/drawingml/2006/main" xmlns:r="http://schemas.openxmlformats.org/officeDocument/2006/relationships" xmlns:p="http://schemas.openxmlformats.org/presentationml/2006/main">
   <p:cSld>
     <p:spTree>
@@ -6826,7 +7569,7 @@
           <a:p>
             <a:r>
               <a:rPr lang="fr-FR" dirty="0" err="1"/>
-              <a:t>From</a:t>
+              <a:t>Status</a:t>
             </a:r>
             <a:r>
               <a:rPr lang="fr-FR" dirty="0"/>
@@ -6862,7 +7605,9 @@
         </p:nvSpPr>
         <p:spPr/>
         <p:txBody>
-          <a:bodyPr/>
+          <a:bodyPr>
+            <a:normAutofit lnSpcReduction="10000"/>
+          </a:bodyPr>
           <a:lstStyle/>
           <a:p>
             <a:r>
@@ -6878,6 +7623,17 @@
             </a:r>
           </a:p>
           <a:p>
+            <a:pPr lvl="1"/>
+            <a:r>
+              <a:rPr lang="en-US" i="1" dirty="0"/>
+              <a:t>Function-oriented</a:t>
+            </a:r>
+            <a:r>
+              <a:rPr lang="en-US" dirty="0"/>
+              <a:t> shell</a:t>
+            </a:r>
+          </a:p>
+          <a:p>
             <a:r>
               <a:rPr lang="en-US" dirty="0"/>
               <a:t>A new shell language that builds on the themes pioneered by PowerShell</a:t>
@@ -6895,6 +7651,13 @@
             <a:r>
               <a:rPr lang="en-US" dirty="0"/>
               <a:t>“real” programmability</a:t>
+            </a:r>
+          </a:p>
+          <a:p>
+            <a:pPr lvl="1"/>
+            <a:r>
+              <a:rPr lang="en-US" dirty="0"/>
+              <a:t> direct support for functional idioms</a:t>
             </a:r>
           </a:p>
         </p:txBody>
@@ -6931,10 +7694,10 @@
       </p:grpSpPr>
       <p:sp>
         <p:nvSpPr>
-          <p:cNvPr id="4" name="Title 3">
+          <p:cNvPr id="2" name="Titre 1">
             <a:extLst>
               <a:ext uri="{FF2B5EF4-FFF2-40B4-BE49-F238E27FC236}">
-                <a16:creationId xmlns:a16="http://schemas.microsoft.com/office/drawing/2014/main" id="{2B167248-C99C-E892-89E1-4CBB81F02F90}"/>
+                <a16:creationId xmlns:a16="http://schemas.microsoft.com/office/drawing/2014/main" id="{5191E0F2-FE77-51ED-3F72-223B58926E74}"/>
               </a:ext>
             </a:extLst>
           </p:cNvPr>
@@ -6945,29 +7708,37 @@
             <p:ph type="title"/>
           </p:nvPr>
         </p:nvSpPr>
-        <p:spPr>
-          <a:xfrm>
-            <a:off x="831850" y="529389"/>
-            <a:ext cx="10515600" cy="1004637"/>
-          </a:xfrm>
-        </p:spPr>
+        <p:spPr/>
         <p:txBody>
           <a:bodyPr/>
           <a:lstStyle/>
           <a:p>
             <a:r>
-              <a:rPr lang="en-GB"/>
-              <a:t>Demos</a:t>
-            </a:r>
+              <a:rPr lang="fr-FR" dirty="0" err="1"/>
+              <a:t>Status</a:t>
+            </a:r>
+            <a:r>
+              <a:rPr lang="fr-FR" dirty="0"/>
+              <a:t> 2023 (last </a:t>
+            </a:r>
+            <a:r>
+              <a:rPr lang="fr-FR" dirty="0" err="1"/>
+              <a:t>year</a:t>
+            </a:r>
+            <a:r>
+              <a:rPr lang="fr-FR" dirty="0"/>
+              <a:t>)</a:t>
+            </a:r>
+            <a:endParaRPr lang="en-GB" dirty="0"/>
           </a:p>
         </p:txBody>
       </p:sp>
       <p:sp>
         <p:nvSpPr>
-          <p:cNvPr id="5" name="Text Placeholder 4">
+          <p:cNvPr id="3" name="Espace réservé du contenu 2">
             <a:extLst>
               <a:ext uri="{FF2B5EF4-FFF2-40B4-BE49-F238E27FC236}">
-                <a16:creationId xmlns:a16="http://schemas.microsoft.com/office/drawing/2014/main" id="{2CACAFC7-78CB-98F9-FEF3-D3E8C9FF6E6F}"/>
+                <a16:creationId xmlns:a16="http://schemas.microsoft.com/office/drawing/2014/main" id="{07D5023A-BA6F-B725-CF78-FD889E577EA6}"/>
               </a:ext>
             </a:extLst>
           </p:cNvPr>
@@ -6975,70 +7746,65 @@
             <a:spLocks noGrp="1"/>
           </p:cNvSpPr>
           <p:nvPr>
-            <p:ph type="body" idx="1"/>
+            <p:ph idx="1"/>
           </p:nvPr>
         </p:nvSpPr>
-        <p:spPr>
-          <a:xfrm>
-            <a:off x="831850" y="1653758"/>
-            <a:ext cx="10515600" cy="1500187"/>
-          </a:xfrm>
-        </p:spPr>
+        <p:spPr/>
         <p:txBody>
           <a:bodyPr/>
           <a:lstStyle/>
           <a:p>
             <a:r>
-              <a:rPr lang="en-GB"/>
-              <a:t>We love Demos!</a:t>
-            </a:r>
+              <a:rPr lang="en-US" dirty="0"/>
+              <a:t>Runtime needs semantic validation</a:t>
+            </a:r>
+          </a:p>
+          <a:p>
+            <a:pPr lvl="1"/>
+            <a:r>
+              <a:rPr lang="en-US" dirty="0"/>
+              <a:t>Do I have the right idiom?</a:t>
+            </a:r>
+          </a:p>
+          <a:p>
+            <a:r>
+              <a:rPr lang="en-US" dirty="0"/>
+              <a:t> Number of users: 1</a:t>
+            </a:r>
+          </a:p>
+          <a:p>
+            <a:r>
+              <a:rPr lang="en-US" dirty="0"/>
+              <a:t>No ci/cd setup</a:t>
+            </a:r>
+          </a:p>
+          <a:p>
+            <a:r>
+              <a:rPr lang="en-US" dirty="0"/>
+              <a:t>No binary releases</a:t>
+            </a:r>
+          </a:p>
+          <a:p>
+            <a:r>
+              <a:rPr lang="en-US" dirty="0"/>
+              <a:t>No high-level documentation</a:t>
+            </a:r>
+          </a:p>
+          <a:p>
+            <a:r>
+              <a:rPr lang="en-US" dirty="0"/>
+              <a:t>Only builds with .NET desktop</a:t>
+            </a:r>
+          </a:p>
+          <a:p>
+            <a:endParaRPr lang="en-US" dirty="0"/>
           </a:p>
         </p:txBody>
       </p:sp>
-      <p:pic>
-        <p:nvPicPr>
-          <p:cNvPr id="9" name="Picture 9">
-            <a:extLst>
-              <a:ext uri="{FF2B5EF4-FFF2-40B4-BE49-F238E27FC236}">
-                <a16:creationId xmlns:a16="http://schemas.microsoft.com/office/drawing/2014/main" id="{776AC288-703A-8014-23CA-E040CDD7E976}"/>
-              </a:ext>
-            </a:extLst>
-          </p:cNvPr>
-          <p:cNvPicPr>
-            <a:picLocks noChangeAspect="1"/>
-          </p:cNvPicPr>
-          <p:nvPr/>
-        </p:nvPicPr>
-        <p:blipFill>
-          <a:blip r:embed="rId2"/>
-          <a:stretch>
-            <a:fillRect/>
-          </a:stretch>
-        </p:blipFill>
-        <p:spPr>
-          <a:xfrm>
-            <a:off x="3404191" y="615392"/>
-            <a:ext cx="6127897" cy="5060147"/>
-          </a:xfrm>
-          <a:prstGeom prst="rect">
-            <a:avLst/>
-          </a:prstGeom>
-          <a:ln>
-            <a:noFill/>
-          </a:ln>
-          <a:effectLst>
-            <a:outerShdw blurRad="292100" dist="139700" dir="2700000" algn="tl" rotWithShape="0">
-              <a:srgbClr val="333333">
-                <a:alpha val="65000"/>
-              </a:srgbClr>
-            </a:outerShdw>
-          </a:effectLst>
-        </p:spPr>
-      </p:pic>
     </p:spTree>
     <p:extLst>
       <p:ext uri="{BB962C8B-B14F-4D97-AF65-F5344CB8AC3E}">
-        <p14:creationId xmlns:p14="http://schemas.microsoft.com/office/powerpoint/2010/main" val="3317259441"/>
+        <p14:creationId xmlns:p14="http://schemas.microsoft.com/office/powerpoint/2010/main" val="3316478797"/>
       </p:ext>
     </p:extLst>
   </p:cSld>
@@ -8745,6 +9511,15 @@
 </file>
 
 <file path=customXml/item1.xml><?xml version="1.0" encoding="utf-8"?>
+<?mso-contentType ?>
+<FormTemplates xmlns="http://schemas.microsoft.com/sharepoint/v3/contenttype/forms">
+  <Display>DocumentLibraryForm</Display>
+  <Edit>DocumentLibraryForm</Edit>
+  <New>DocumentLibraryForm</New>
+</FormTemplates>
+</file>
+
+<file path=customXml/item2.xml><?xml version="1.0" encoding="utf-8"?>
 <ct:contentTypeSchema xmlns:ct="http://schemas.microsoft.com/office/2006/metadata/contentType" xmlns:ma="http://schemas.microsoft.com/office/2006/metadata/properties/metaAttributes" ct:_="" ma:_="" ma:contentTypeName="Document" ma:contentTypeID="0x010100465209AEF8DBB7418260C2A216A09DE4" ma:contentTypeVersion="13" ma:contentTypeDescription="Crée un document." ma:contentTypeScope="" ma:versionID="aacbea182e442c081ba3c266ed8afaf1">
   <xsd:schema xmlns:xsd="http://www.w3.org/2001/XMLSchema" xmlns:xs="http://www.w3.org/2001/XMLSchema" xmlns:p="http://schemas.microsoft.com/office/2006/metadata/properties" xmlns:ns2="2347cc20-e10c-452d-848a-c18e83138525" xmlns:ns3="85c0ce47-fe9c-4809-bf88-519c39a738e6" targetNamespace="http://schemas.microsoft.com/office/2006/metadata/properties" ma:root="true" ma:fieldsID="fe2d8c2794f7059c45f035c586269f9a" ns2:_="" ns3:_="">
     <xsd:import namespace="2347cc20-e10c-452d-848a-c18e83138525"/>
@@ -8951,15 +9726,6 @@
 </ct:contentTypeSchema>
 </file>
 
-<file path=customXml/item2.xml><?xml version="1.0" encoding="utf-8"?>
-<?mso-contentType ?>
-<FormTemplates xmlns="http://schemas.microsoft.com/sharepoint/v3/contenttype/forms">
-  <Display>DocumentLibraryForm</Display>
-  <Edit>DocumentLibraryForm</Edit>
-  <New>DocumentLibraryForm</New>
-</FormTemplates>
-</file>
-
 <file path=customXml/item3.xml><?xml version="1.0" encoding="utf-8"?>
 <p:properties xmlns:p="http://schemas.microsoft.com/office/2006/metadata/properties" xmlns:xsi="http://www.w3.org/2001/XMLSchema-instance" xmlns:pc="http://schemas.microsoft.com/office/infopath/2007/PartnerControls">
   <documentManagement>
@@ -8972,6 +9738,14 @@
 </file>
 
 <file path=customXml/itemProps1.xml><?xml version="1.0" encoding="utf-8"?>
+<ds:datastoreItem xmlns:ds="http://schemas.openxmlformats.org/officeDocument/2006/customXml" ds:itemID="{57D9B22B-F436-4FE5-B6C0-65AB2260F593}">
+  <ds:schemaRefs>
+    <ds:schemaRef ds:uri="http://schemas.microsoft.com/sharepoint/v3/contenttype/forms"/>
+  </ds:schemaRefs>
+</ds:datastoreItem>
+</file>
+
+<file path=customXml/itemProps2.xml><?xml version="1.0" encoding="utf-8"?>
 <ds:datastoreItem xmlns:ds="http://schemas.openxmlformats.org/officeDocument/2006/customXml" ds:itemID="{2D49AF2C-D145-4497-874A-78CB33723463}">
   <ds:schemaRefs>
     <ds:schemaRef ds:uri="http://schemas.microsoft.com/office/2006/metadata/contentType"/>
@@ -8990,14 +9764,6 @@
 </ds:datastoreItem>
 </file>
 
-<file path=customXml/itemProps2.xml><?xml version="1.0" encoding="utf-8"?>
-<ds:datastoreItem xmlns:ds="http://schemas.openxmlformats.org/officeDocument/2006/customXml" ds:itemID="{57D9B22B-F436-4FE5-B6C0-65AB2260F593}">
-  <ds:schemaRefs>
-    <ds:schemaRef ds:uri="http://schemas.microsoft.com/sharepoint/v3/contenttype/forms"/>
-  </ds:schemaRefs>
-</ds:datastoreItem>
-</file>
-
 <file path=customXml/itemProps3.xml><?xml version="1.0" encoding="utf-8"?>
 <ds:datastoreItem xmlns:ds="http://schemas.openxmlformats.org/officeDocument/2006/customXml" ds:itemID="{AA9C06E3-346E-408E-B352-32E922A070CE}">
   <ds:schemaRefs>

</xml_diff>

<commit_message>
Post presentations. The braid_examples.tl is a start at a tour of braid.
</commit_message>
<xml_diff>
--- a/payette_2024_braid.pptx
+++ b/payette_2024_braid.pptx
@@ -8,10 +8,10 @@
     <p:sldMasterId id="2147483684" r:id="rId7"/>
   </p:sldMasterIdLst>
   <p:notesMasterIdLst>
-    <p:notesMasterId r:id="rId22"/>
+    <p:notesMasterId r:id="rId25"/>
   </p:notesMasterIdLst>
   <p:handoutMasterIdLst>
-    <p:handoutMasterId r:id="rId23"/>
+    <p:handoutMasterId r:id="rId26"/>
   </p:handoutMasterIdLst>
   <p:sldIdLst>
     <p:sldId id="272" r:id="rId8"/>
@@ -25,9 +25,12 @@
     <p:sldId id="274" r:id="rId16"/>
     <p:sldId id="275" r:id="rId17"/>
     <p:sldId id="277" r:id="rId18"/>
-    <p:sldId id="264" r:id="rId19"/>
-    <p:sldId id="276" r:id="rId20"/>
-    <p:sldId id="265" r:id="rId21"/>
+    <p:sldId id="279" r:id="rId19"/>
+    <p:sldId id="280" r:id="rId20"/>
+    <p:sldId id="264" r:id="rId21"/>
+    <p:sldId id="276" r:id="rId22"/>
+    <p:sldId id="278" r:id="rId23"/>
+    <p:sldId id="265" r:id="rId24"/>
   </p:sldIdLst>
   <p:sldSz cx="12192000" cy="6858000"/>
   <p:notesSz cx="6858000" cy="9144000"/>
@@ -146,8 +149,11 @@
             <p14:sldId id="274"/>
             <p14:sldId id="275"/>
             <p14:sldId id="277"/>
+            <p14:sldId id="279"/>
+            <p14:sldId id="280"/>
             <p14:sldId id="264"/>
             <p14:sldId id="276"/>
+            <p14:sldId id="278"/>
             <p14:sldId id="265"/>
           </p14:sldIdLst>
         </p14:section>
@@ -5281,16 +5287,7 @@
                 <a:latin typeface="Segoe UI Light" panose="020B0502040204020203" pitchFamily="34" charset="0"/>
                 <a:cs typeface="Segoe UI Light" panose="020B0502040204020203" pitchFamily="34" charset="0"/>
               </a:rPr>
-              <a:t> Up: </a:t>
-            </a:r>
-            <a:r>
-              <a:rPr lang="en-US" sz="6000" b="1" dirty="0">
-                <a:solidFill>
-                  <a:srgbClr val="346296"/>
-                </a:solidFill>
-                <a:latin typeface="+mn-lt"/>
-              </a:rPr>
-              <a:t>Braid: One Year In</a:t>
+              <a:t> Up: Braid One Year In</a:t>
             </a:r>
             <a:endParaRPr lang="en-DE" sz="6000" b="1" dirty="0">
               <a:solidFill>
@@ -5383,7 +5380,9 @@
         </p:nvSpPr>
         <p:spPr/>
         <p:txBody>
-          <a:bodyPr/>
+          <a:bodyPr>
+            <a:normAutofit lnSpcReduction="10000"/>
+          </a:bodyPr>
           <a:lstStyle/>
           <a:p>
             <a:r>
@@ -5404,7 +5403,7 @@
               <a:t> Number of users: </a:t>
             </a:r>
             <a:r>
-              <a:rPr lang="en-US" dirty="0">
+              <a:rPr lang="en-US" b="1" dirty="0">
                 <a:solidFill>
                   <a:srgbClr val="C00000"/>
                 </a:solidFill>
@@ -5415,13 +5414,21 @@
           <a:p>
             <a:r>
               <a:rPr lang="en-US" dirty="0"/>
-              <a:t>Have a PR for a ci/cd setup</a:t>
-            </a:r>
-          </a:p>
-          <a:p>
+              <a:t>Have a PR from </a:t>
+            </a:r>
+            <a:r>
+              <a:rPr lang="en-US" dirty="0" err="1"/>
+              <a:t>JamesBru</a:t>
+            </a:r>
             <a:r>
               <a:rPr lang="en-US" dirty="0"/>
-              <a:t>Once the ci/cd pipeline we will have binary releases</a:t>
+              <a:t> for a ci/cd setup</a:t>
+            </a:r>
+          </a:p>
+          <a:p>
+            <a:r>
+              <a:rPr lang="en-US" dirty="0"/>
+              <a:t>Once the ci/cd pipeline exists we be able to have binary releases</a:t>
             </a:r>
           </a:p>
           <a:p>
@@ -5521,7 +5528,7 @@
         </p:spPr>
         <p:txBody>
           <a:bodyPr>
-            <a:normAutofit fontScale="92500" lnSpcReduction="20000"/>
+            <a:normAutofit lnSpcReduction="10000"/>
           </a:bodyPr>
           <a:lstStyle/>
           <a:p>
@@ -5534,20 +5541,8 @@
             <a:pPr lvl="1"/>
             <a:r>
               <a:rPr lang="en-US" dirty="0"/>
-              <a:t>No expression-mode. Only command mode. No keywords, no operators, only functions)</a:t>
-            </a:r>
-          </a:p>
-          <a:p>
-            <a:pPr lvl="2"/>
-            <a:r>
-              <a:rPr lang="en-US" dirty="0"/>
-              <a:t>So yes – it is a LISP </a:t>
-            </a:r>
-            <a:r>
-              <a:rPr lang="en-US" dirty="0" err="1"/>
-              <a:t>varient</a:t>
-            </a:r>
-            <a:endParaRPr lang="en-US" dirty="0"/>
+              <a:t>No expression-mode. Only command mode. No keywords, no operators, only prefix functions)</a:t>
+            </a:r>
           </a:p>
           <a:p>
             <a:pPr lvl="1"/>
@@ -5598,30 +5593,29 @@
                 <a:latin typeface="Cascadia Code" panose="020B0609020000020004" pitchFamily="49" charset="0"/>
                 <a:cs typeface="Cascadia Code" panose="020B0609020000020004" pitchFamily="49" charset="0"/>
               </a:rPr>
-              <a:t>function arg1        (nested call) arg3)            </a:t>
+              <a:t>function arg1        (nested call) arg3) </a:t>
+            </a:r>
+          </a:p>
+          <a:p>
+            <a:pPr marL="457200" lvl="1" indent="0">
+              <a:buNone/>
+            </a:pPr>
+            <a:r>
+              <a:rPr lang="en-US" sz="2800" dirty="0"/>
+              <a:t>So yes – it is a LISP variant…</a:t>
+            </a:r>
+            <a:r>
+              <a:rPr lang="en-US" sz="2800" i="1" dirty="0">
+                <a:latin typeface="Cascadia Code" panose="020B0609020000020004" pitchFamily="49" charset="0"/>
+                <a:cs typeface="Cascadia Code" panose="020B0609020000020004" pitchFamily="49" charset="0"/>
+              </a:rPr>
+              <a:t>           </a:t>
             </a:r>
           </a:p>
           <a:p>
             <a:r>
               <a:rPr lang="en-US" dirty="0"/>
-              <a:t>Essentially a LISP </a:t>
-            </a:r>
-            <a:r>
-              <a:rPr lang="en-US" dirty="0" err="1"/>
-              <a:t>varient</a:t>
-            </a:r>
-            <a:endParaRPr lang="en-US" dirty="0"/>
-          </a:p>
-          <a:p>
-            <a:r>
-              <a:rPr lang="en-US" dirty="0"/>
-              <a:t>Lexically scoped with closures</a:t>
-            </a:r>
-          </a:p>
-          <a:p>
-            <a:r>
-              <a:rPr lang="en-US" dirty="0"/>
-              <a:t>Macros (e.g. for loop)</a:t>
+              <a:t>Lexically scoped with Closures and Macros (expressiveness)</a:t>
             </a:r>
           </a:p>
           <a:p>
@@ -5652,6 +5646,436 @@
 </file>
 
 <file path=ppt/slides/slide12.xml><?xml version="1.0" encoding="utf-8"?>
+<p:sld xmlns:a="http://schemas.openxmlformats.org/drawingml/2006/main" xmlns:r="http://schemas.openxmlformats.org/officeDocument/2006/relationships" xmlns:p="http://schemas.openxmlformats.org/presentationml/2006/main">
+  <p:cSld>
+    <p:spTree>
+      <p:nvGrpSpPr>
+        <p:cNvPr id="1" name=""/>
+        <p:cNvGrpSpPr/>
+        <p:nvPr/>
+      </p:nvGrpSpPr>
+      <p:grpSpPr>
+        <a:xfrm>
+          <a:off x="0" y="0"/>
+          <a:ext cx="0" cy="0"/>
+          <a:chOff x="0" y="0"/>
+          <a:chExt cx="0" cy="0"/>
+        </a:xfrm>
+      </p:grpSpPr>
+      <p:sp>
+        <p:nvSpPr>
+          <p:cNvPr id="2" name="Title 1">
+            <a:extLst>
+              <a:ext uri="{FF2B5EF4-FFF2-40B4-BE49-F238E27FC236}">
+                <a16:creationId xmlns:a16="http://schemas.microsoft.com/office/drawing/2014/main" id="{AD0B4C2D-F36A-3132-DE9B-92FA6B46F308}"/>
+              </a:ext>
+            </a:extLst>
+          </p:cNvPr>
+          <p:cNvSpPr>
+            <a:spLocks noGrp="1"/>
+          </p:cNvSpPr>
+          <p:nvPr>
+            <p:ph type="title"/>
+          </p:nvPr>
+        </p:nvSpPr>
+        <p:spPr/>
+        <p:txBody>
+          <a:bodyPr/>
+          <a:lstStyle/>
+          <a:p>
+            <a:r>
+              <a:rPr lang="en-US" dirty="0"/>
+              <a:t>Braid Basics cont’d</a:t>
+            </a:r>
+          </a:p>
+        </p:txBody>
+      </p:sp>
+      <p:sp>
+        <p:nvSpPr>
+          <p:cNvPr id="3" name="Content Placeholder 2">
+            <a:extLst>
+              <a:ext uri="{FF2B5EF4-FFF2-40B4-BE49-F238E27FC236}">
+                <a16:creationId xmlns:a16="http://schemas.microsoft.com/office/drawing/2014/main" id="{10EAFC8D-0AFC-5604-FCF4-CDDCCF637F2C}"/>
+              </a:ext>
+            </a:extLst>
+          </p:cNvPr>
+          <p:cNvSpPr>
+            <a:spLocks noGrp="1"/>
+          </p:cNvSpPr>
+          <p:nvPr>
+            <p:ph idx="1"/>
+          </p:nvPr>
+        </p:nvSpPr>
+        <p:spPr>
+          <a:xfrm>
+            <a:off x="838200" y="1395248"/>
+            <a:ext cx="10515600" cy="5097627"/>
+          </a:xfrm>
+        </p:spPr>
+        <p:txBody>
+          <a:bodyPr>
+            <a:normAutofit lnSpcReduction="10000"/>
+          </a:bodyPr>
+          <a:lstStyle/>
+          <a:p>
+            <a:r>
+              <a:rPr lang="en-US" dirty="0"/>
+              <a:t>Many literals:</a:t>
+            </a:r>
+          </a:p>
+          <a:p>
+            <a:pPr lvl="1"/>
+            <a:r>
+              <a:rPr lang="en-US" dirty="0"/>
+              <a:t>^int				 ; type literal</a:t>
+            </a:r>
+          </a:p>
+          <a:p>
+            <a:pPr lvl="1"/>
+            <a:r>
+              <a:rPr lang="en-US" dirty="0">
+                <a:latin typeface="Cascadia Code" panose="020B0609020000020004" pitchFamily="49" charset="0"/>
+                <a:cs typeface="Cascadia Code" panose="020B0609020000020004" pitchFamily="49" charset="0"/>
+              </a:rPr>
+              <a:t>"</a:t>
+            </a:r>
+            <a:r>
+              <a:rPr lang="en-US" dirty="0"/>
+              <a:t>hello</a:t>
+            </a:r>
+            <a:r>
+              <a:rPr lang="en-US" dirty="0">
+                <a:latin typeface="Cascadia Code" panose="020B0609020000020004" pitchFamily="49" charset="0"/>
+                <a:cs typeface="Cascadia Code" panose="020B0609020000020004" pitchFamily="49" charset="0"/>
+              </a:rPr>
+              <a:t>"</a:t>
+            </a:r>
+            <a:r>
+              <a:rPr lang="en-US" dirty="0"/>
+              <a:t> </a:t>
+            </a:r>
+            <a:r>
+              <a:rPr lang="en-US" dirty="0">
+                <a:latin typeface="Cascadia Code" panose="020B0609020000020004" pitchFamily="49" charset="0"/>
+                <a:cs typeface="Cascadia Code" panose="020B0609020000020004" pitchFamily="49" charset="0"/>
+              </a:rPr>
+              <a:t>"""</a:t>
+            </a:r>
+            <a:r>
+              <a:rPr lang="en-US" dirty="0"/>
+              <a:t>foo</a:t>
+            </a:r>
+            <a:r>
+              <a:rPr lang="en-US" dirty="0">
+                <a:latin typeface="Cascadia Code" panose="020B0609020000020004" pitchFamily="49" charset="0"/>
+                <a:cs typeface="Cascadia Code" panose="020B0609020000020004" pitchFamily="49" charset="0"/>
+              </a:rPr>
+              <a:t>""" </a:t>
+            </a:r>
+            <a:r>
+              <a:rPr lang="en-US" dirty="0"/>
+              <a:t>	 ; string literals</a:t>
+            </a:r>
+          </a:p>
+          <a:p>
+            <a:pPr lvl="1"/>
+            <a:r>
+              <a:rPr lang="en-US" dirty="0"/>
+              <a:t>#”[a-z][a-z0-9]”		 ; regex literal</a:t>
+            </a:r>
+          </a:p>
+          <a:p>
+            <a:pPr lvl="1"/>
+            <a:r>
+              <a:rPr lang="en-US" dirty="0"/>
+              <a:t>123, 1.45, 0xf3_fe		 ; numeric literals</a:t>
+            </a:r>
+          </a:p>
+          <a:p>
+            <a:pPr lvl="1"/>
+            <a:r>
+              <a:rPr lang="en-US" dirty="0"/>
+              <a:t>:hello				 ; “keyword”</a:t>
+            </a:r>
+          </a:p>
+          <a:p>
+            <a:pPr lvl="1"/>
+            <a:r>
+              <a:rPr lang="en-US" dirty="0"/>
+              <a:t>-path				 ; parameters literal</a:t>
+            </a:r>
+          </a:p>
+          <a:p>
+            <a:pPr lvl="1"/>
+            <a:r>
+              <a:rPr lang="en-US" dirty="0"/>
+              <a:t>{ “a” 1 “b” 2}		 ; dictionary literal</a:t>
+            </a:r>
+          </a:p>
+          <a:p>
+            <a:pPr lvl="1"/>
+            <a:r>
+              <a:rPr lang="en-US" dirty="0"/>
+              <a:t>#{“red” “blue” “green”}	 ; set literal</a:t>
+            </a:r>
+          </a:p>
+          <a:p>
+            <a:pPr lvl="1"/>
+            <a:r>
+              <a:rPr lang="en-US" dirty="0"/>
+              <a:t>[1 2 3]				 ; vector literal</a:t>
+            </a:r>
+          </a:p>
+        </p:txBody>
+      </p:sp>
+    </p:spTree>
+    <p:extLst>
+      <p:ext uri="{BB962C8B-B14F-4D97-AF65-F5344CB8AC3E}">
+        <p14:creationId xmlns:p14="http://schemas.microsoft.com/office/powerpoint/2010/main" val="718300919"/>
+      </p:ext>
+    </p:extLst>
+  </p:cSld>
+  <p:clrMapOvr>
+    <a:masterClrMapping/>
+  </p:clrMapOvr>
+</p:sld>
+</file>
+
+<file path=ppt/slides/slide13.xml><?xml version="1.0" encoding="utf-8"?>
+<p:sld xmlns:a="http://schemas.openxmlformats.org/drawingml/2006/main" xmlns:r="http://schemas.openxmlformats.org/officeDocument/2006/relationships" xmlns:p="http://schemas.openxmlformats.org/presentationml/2006/main">
+  <p:cSld>
+    <p:spTree>
+      <p:nvGrpSpPr>
+        <p:cNvPr id="1" name=""/>
+        <p:cNvGrpSpPr/>
+        <p:nvPr/>
+      </p:nvGrpSpPr>
+      <p:grpSpPr>
+        <a:xfrm>
+          <a:off x="0" y="0"/>
+          <a:ext cx="0" cy="0"/>
+          <a:chOff x="0" y="0"/>
+          <a:chExt cx="0" cy="0"/>
+        </a:xfrm>
+      </p:grpSpPr>
+      <p:sp>
+        <p:nvSpPr>
+          <p:cNvPr id="2" name="Title 1">
+            <a:extLst>
+              <a:ext uri="{FF2B5EF4-FFF2-40B4-BE49-F238E27FC236}">
+                <a16:creationId xmlns:a16="http://schemas.microsoft.com/office/drawing/2014/main" id="{AD0B4C2D-F36A-3132-DE9B-92FA6B46F308}"/>
+              </a:ext>
+            </a:extLst>
+          </p:cNvPr>
+          <p:cNvSpPr>
+            <a:spLocks noGrp="1"/>
+          </p:cNvSpPr>
+          <p:nvPr>
+            <p:ph type="title"/>
+          </p:nvPr>
+        </p:nvSpPr>
+        <p:spPr/>
+        <p:txBody>
+          <a:bodyPr/>
+          <a:lstStyle/>
+          <a:p>
+            <a:r>
+              <a:rPr lang="en-US" dirty="0"/>
+              <a:t>Braid Basics cont’d</a:t>
+            </a:r>
+          </a:p>
+        </p:txBody>
+      </p:sp>
+      <p:sp>
+        <p:nvSpPr>
+          <p:cNvPr id="3" name="Content Placeholder 2">
+            <a:extLst>
+              <a:ext uri="{FF2B5EF4-FFF2-40B4-BE49-F238E27FC236}">
+                <a16:creationId xmlns:a16="http://schemas.microsoft.com/office/drawing/2014/main" id="{10EAFC8D-0AFC-5604-FCF4-CDDCCF637F2C}"/>
+              </a:ext>
+            </a:extLst>
+          </p:cNvPr>
+          <p:cNvSpPr>
+            <a:spLocks noGrp="1"/>
+          </p:cNvSpPr>
+          <p:nvPr>
+            <p:ph idx="1"/>
+          </p:nvPr>
+        </p:nvSpPr>
+        <p:spPr>
+          <a:xfrm>
+            <a:off x="838200" y="1395248"/>
+            <a:ext cx="10515600" cy="5097627"/>
+          </a:xfrm>
+        </p:spPr>
+        <p:txBody>
+          <a:bodyPr>
+            <a:normAutofit fontScale="85000" lnSpcReduction="20000"/>
+          </a:bodyPr>
+          <a:lstStyle/>
+          <a:p>
+            <a:r>
+              <a:rPr lang="en-US" dirty="0"/>
+              <a:t>JSON compatible. The following is a valid Braid script:</a:t>
+            </a:r>
+          </a:p>
+          <a:p>
+            <a:endParaRPr lang="en-US" dirty="0"/>
+          </a:p>
+          <a:p>
+            <a:pPr marL="457200" lvl="1" indent="0">
+              <a:buNone/>
+            </a:pPr>
+            <a:r>
+              <a:rPr lang="en-US" dirty="0">
+                <a:latin typeface="Cascadia Code" panose="020B0609020000020004" pitchFamily="49" charset="0"/>
+                <a:cs typeface="Cascadia Code" panose="020B0609020000020004" pitchFamily="49" charset="0"/>
+              </a:rPr>
+              <a:t>[</a:t>
+            </a:r>
+          </a:p>
+          <a:p>
+            <a:pPr marL="457200" lvl="1" indent="0">
+              <a:buNone/>
+            </a:pPr>
+            <a:r>
+              <a:rPr lang="en-US" dirty="0">
+                <a:latin typeface="Cascadia Code" panose="020B0609020000020004" pitchFamily="49" charset="0"/>
+                <a:cs typeface="Cascadia Code" panose="020B0609020000020004" pitchFamily="49" charset="0"/>
+              </a:rPr>
+              <a:t>    {</a:t>
+            </a:r>
+          </a:p>
+          <a:p>
+            <a:pPr marL="457200" lvl="1" indent="0">
+              <a:buNone/>
+            </a:pPr>
+            <a:r>
+              <a:rPr lang="en-US" dirty="0">
+                <a:latin typeface="Cascadia Code" panose="020B0609020000020004" pitchFamily="49" charset="0"/>
+                <a:cs typeface="Cascadia Code" panose="020B0609020000020004" pitchFamily="49" charset="0"/>
+              </a:rPr>
+              <a:t>       "a" : 1,</a:t>
+            </a:r>
+          </a:p>
+          <a:p>
+            <a:pPr marL="457200" lvl="1" indent="0">
+              <a:buNone/>
+            </a:pPr>
+            <a:r>
+              <a:rPr lang="en-US" dirty="0">
+                <a:latin typeface="Cascadia Code" panose="020B0609020000020004" pitchFamily="49" charset="0"/>
+                <a:cs typeface="Cascadia Code" panose="020B0609020000020004" pitchFamily="49" charset="0"/>
+              </a:rPr>
+              <a:t>       "b" : 2</a:t>
+            </a:r>
+          </a:p>
+          <a:p>
+            <a:pPr marL="457200" lvl="1" indent="0">
+              <a:buNone/>
+            </a:pPr>
+            <a:r>
+              <a:rPr lang="en-US" dirty="0">
+                <a:latin typeface="Cascadia Code" panose="020B0609020000020004" pitchFamily="49" charset="0"/>
+                <a:cs typeface="Cascadia Code" panose="020B0609020000020004" pitchFamily="49" charset="0"/>
+              </a:rPr>
+              <a:t>    },</a:t>
+            </a:r>
+          </a:p>
+          <a:p>
+            <a:pPr marL="457200" lvl="1" indent="0">
+              <a:buNone/>
+            </a:pPr>
+            <a:r>
+              <a:rPr lang="en-US" dirty="0">
+                <a:latin typeface="Cascadia Code" panose="020B0609020000020004" pitchFamily="49" charset="0"/>
+                <a:cs typeface="Cascadia Code" panose="020B0609020000020004" pitchFamily="49" charset="0"/>
+              </a:rPr>
+              <a:t>    {</a:t>
+            </a:r>
+          </a:p>
+          <a:p>
+            <a:pPr marL="457200" lvl="1" indent="0">
+              <a:buNone/>
+            </a:pPr>
+            <a:r>
+              <a:rPr lang="en-US" dirty="0">
+                <a:latin typeface="Cascadia Code" panose="020B0609020000020004" pitchFamily="49" charset="0"/>
+                <a:cs typeface="Cascadia Code" panose="020B0609020000020004" pitchFamily="49" charset="0"/>
+              </a:rPr>
+              <a:t>        "foo" : "bar"</a:t>
+            </a:r>
+          </a:p>
+          <a:p>
+            <a:pPr marL="457200" lvl="1" indent="0">
+              <a:buNone/>
+            </a:pPr>
+            <a:r>
+              <a:rPr lang="en-US" dirty="0">
+                <a:latin typeface="Cascadia Code" panose="020B0609020000020004" pitchFamily="49" charset="0"/>
+                <a:cs typeface="Cascadia Code" panose="020B0609020000020004" pitchFamily="49" charset="0"/>
+              </a:rPr>
+              <a:t>    },</a:t>
+            </a:r>
+          </a:p>
+          <a:p>
+            <a:pPr marL="457200" lvl="1" indent="0">
+              <a:buNone/>
+            </a:pPr>
+            <a:r>
+              <a:rPr lang="en-US" dirty="0">
+                <a:latin typeface="Cascadia Code" panose="020B0609020000020004" pitchFamily="49" charset="0"/>
+                <a:cs typeface="Cascadia Code" panose="020B0609020000020004" pitchFamily="49" charset="0"/>
+              </a:rPr>
+              <a:t>    [1, 2, 3],</a:t>
+            </a:r>
+          </a:p>
+          <a:p>
+            <a:pPr marL="457200" lvl="1" indent="0">
+              <a:buNone/>
+            </a:pPr>
+            <a:r>
+              <a:rPr lang="en-US" dirty="0">
+                <a:latin typeface="Cascadia Code" panose="020B0609020000020004" pitchFamily="49" charset="0"/>
+                <a:cs typeface="Cascadia Code" panose="020B0609020000020004" pitchFamily="49" charset="0"/>
+              </a:rPr>
+              <a:t>    4</a:t>
+            </a:r>
+          </a:p>
+          <a:p>
+            <a:pPr marL="457200" lvl="1" indent="0">
+              <a:buNone/>
+            </a:pPr>
+            <a:r>
+              <a:rPr lang="en-US" dirty="0">
+                <a:latin typeface="Cascadia Code" panose="020B0609020000020004" pitchFamily="49" charset="0"/>
+                <a:cs typeface="Cascadia Code" panose="020B0609020000020004" pitchFamily="49" charset="0"/>
+              </a:rPr>
+              <a:t>]</a:t>
+            </a:r>
+          </a:p>
+          <a:p>
+            <a:pPr marL="457200" lvl="1" indent="0">
+              <a:buNone/>
+            </a:pPr>
+            <a:endParaRPr lang="en-US" dirty="0"/>
+          </a:p>
+        </p:txBody>
+      </p:sp>
+    </p:spTree>
+    <p:extLst>
+      <p:ext uri="{BB962C8B-B14F-4D97-AF65-F5344CB8AC3E}">
+        <p14:creationId xmlns:p14="http://schemas.microsoft.com/office/powerpoint/2010/main" val="2682117113"/>
+      </p:ext>
+    </p:extLst>
+  </p:cSld>
+  <p:clrMapOvr>
+    <a:masterClrMapping/>
+  </p:clrMapOvr>
+</p:sld>
+</file>
+
+<file path=ppt/slides/slide14.xml><?xml version="1.0" encoding="utf-8"?>
 <p:sld xmlns:a="http://schemas.openxmlformats.org/drawingml/2006/main" xmlns:r="http://schemas.openxmlformats.org/officeDocument/2006/relationships" xmlns:p="http://schemas.openxmlformats.org/presentationml/2006/main">
   <p:cSld>
     <p:spTree>
@@ -5787,7 +6211,7 @@
 </p:sld>
 </file>
 
-<file path=ppt/slides/slide13.xml><?xml version="1.0" encoding="utf-8"?>
+<file path=ppt/slides/slide15.xml><?xml version="1.0" encoding="utf-8"?>
 <p:sld xmlns:a="http://schemas.openxmlformats.org/drawingml/2006/main" xmlns:r="http://schemas.openxmlformats.org/officeDocument/2006/relationships" xmlns:p="http://schemas.openxmlformats.org/presentationml/2006/main">
   <p:cSld>
     <p:spTree>
@@ -5860,13 +6284,13 @@
         <p:spPr/>
         <p:txBody>
           <a:bodyPr>
-            <a:normAutofit fontScale="92500"/>
+            <a:normAutofit fontScale="92500" lnSpcReduction="10000"/>
           </a:bodyPr>
           <a:lstStyle/>
           <a:p>
             <a:r>
               <a:rPr lang="en-US" dirty="0"/>
-              <a:t>Can use a dictionary in assignments</a:t>
+              <a:t>Can use a dictionary in assignments (object patterns)</a:t>
             </a:r>
           </a:p>
           <a:p>
@@ -5878,7 +6302,7 @@
                 <a:latin typeface="Cascadia Code" panose="020B0609020000020004" pitchFamily="49" charset="0"/>
                 <a:cs typeface="Cascadia Code" panose="020B0609020000020004" pitchFamily="49" charset="0"/>
               </a:rPr>
-              <a:t>(let { “extension” “txt” “length </a:t>
+              <a:t>(let {“extension” “txt” “length </a:t>
             </a:r>
             <a:r>
               <a:rPr lang="en-US" sz="2600" dirty="0" err="1">
@@ -5898,6 +6322,9 @@
           <a:p>
             <a:r>
               <a:rPr lang="en-US" sz="3000" dirty="0">
+                <a:solidFill>
+                  <a:schemeClr val="accent5"/>
+                </a:solidFill>
                 <a:latin typeface="Cascadia Code" panose="020B0609020000020004" pitchFamily="49" charset="0"/>
                 <a:cs typeface="Cascadia Code" panose="020B0609020000020004" pitchFamily="49" charset="0"/>
               </a:rPr>
@@ -5905,7 +6332,19 @@
             </a:r>
             <a:r>
               <a:rPr lang="en-US" dirty="0"/>
-              <a:t> function</a:t>
+              <a:t> function (kind of like C# </a:t>
+            </a:r>
+            <a:r>
+              <a:rPr lang="en-US" dirty="0">
+                <a:solidFill>
+                  <a:schemeClr val="accent5"/>
+                </a:solidFill>
+              </a:rPr>
+              <a:t>using</a:t>
+            </a:r>
+            <a:r>
+              <a:rPr lang="en-US" dirty="0"/>
+              <a:t>)</a:t>
             </a:r>
           </a:p>
           <a:p>
@@ -6023,7 +6462,7 @@
           <a:p>
             <a:r>
               <a:rPr lang="en-US" dirty="0"/>
-              <a:t>Also some new functions, bug fixes, some performance for</a:t>
+              <a:t>Also some new functions, bug fixes, some performance work</a:t>
             </a:r>
           </a:p>
         </p:txBody>
@@ -6041,7 +6480,160 @@
 </p:sld>
 </file>
 
-<file path=ppt/slides/slide14.xml><?xml version="1.0" encoding="utf-8"?>
+<file path=ppt/slides/slide16.xml><?xml version="1.0" encoding="utf-8"?>
+<p:sld xmlns:a="http://schemas.openxmlformats.org/drawingml/2006/main" xmlns:r="http://schemas.openxmlformats.org/officeDocument/2006/relationships" xmlns:p="http://schemas.openxmlformats.org/presentationml/2006/main">
+  <p:cSld>
+    <p:spTree>
+      <p:nvGrpSpPr>
+        <p:cNvPr id="1" name=""/>
+        <p:cNvGrpSpPr/>
+        <p:nvPr/>
+      </p:nvGrpSpPr>
+      <p:grpSpPr>
+        <a:xfrm>
+          <a:off x="0" y="0"/>
+          <a:ext cx="0" cy="0"/>
+          <a:chOff x="0" y="0"/>
+          <a:chExt cx="0" cy="0"/>
+        </a:xfrm>
+      </p:grpSpPr>
+      <p:sp>
+        <p:nvSpPr>
+          <p:cNvPr id="2" name="Titre 1">
+            <a:extLst>
+              <a:ext uri="{FF2B5EF4-FFF2-40B4-BE49-F238E27FC236}">
+                <a16:creationId xmlns:a16="http://schemas.microsoft.com/office/drawing/2014/main" id="{5191E0F2-FE77-51ED-3F72-223B58926E74}"/>
+              </a:ext>
+            </a:extLst>
+          </p:cNvPr>
+          <p:cNvSpPr>
+            <a:spLocks noGrp="1"/>
+          </p:cNvSpPr>
+          <p:nvPr>
+            <p:ph type="title"/>
+          </p:nvPr>
+        </p:nvSpPr>
+        <p:spPr/>
+        <p:txBody>
+          <a:bodyPr/>
+          <a:lstStyle/>
+          <a:p>
+            <a:r>
+              <a:rPr lang="fr-FR" dirty="0" err="1"/>
+              <a:t>Summary</a:t>
+            </a:r>
+            <a:endParaRPr lang="en-GB" dirty="0"/>
+          </a:p>
+        </p:txBody>
+      </p:sp>
+      <p:sp>
+        <p:nvSpPr>
+          <p:cNvPr id="3" name="Espace réservé du contenu 2">
+            <a:extLst>
+              <a:ext uri="{FF2B5EF4-FFF2-40B4-BE49-F238E27FC236}">
+                <a16:creationId xmlns:a16="http://schemas.microsoft.com/office/drawing/2014/main" id="{07D5023A-BA6F-B725-CF78-FD889E577EA6}"/>
+              </a:ext>
+            </a:extLst>
+          </p:cNvPr>
+          <p:cNvSpPr>
+            <a:spLocks noGrp="1"/>
+          </p:cNvSpPr>
+          <p:nvPr>
+            <p:ph idx="1"/>
+          </p:nvPr>
+        </p:nvSpPr>
+        <p:spPr/>
+        <p:txBody>
+          <a:bodyPr>
+            <a:normAutofit lnSpcReduction="10000"/>
+          </a:bodyPr>
+          <a:lstStyle/>
+          <a:p>
+            <a:r>
+              <a:rPr lang="en-US" dirty="0"/>
+              <a:t>Braid is a work in progress.</a:t>
+            </a:r>
+          </a:p>
+          <a:p>
+            <a:r>
+              <a:rPr lang="en-US" dirty="0"/>
+              <a:t>What is it good for?</a:t>
+            </a:r>
+          </a:p>
+          <a:p>
+            <a:pPr lvl="1"/>
+            <a:r>
+              <a:rPr lang="en-US" dirty="0"/>
+              <a:t>Actually not too concerned about that…</a:t>
+            </a:r>
+          </a:p>
+          <a:p>
+            <a:pPr lvl="1"/>
+            <a:r>
+              <a:rPr lang="en-US" dirty="0"/>
+              <a:t>Painters </a:t>
+            </a:r>
+            <a:r>
+              <a:rPr lang="en-US" dirty="0" err="1"/>
+              <a:t>gotta</a:t>
+            </a:r>
+            <a:r>
+              <a:rPr lang="en-US" dirty="0"/>
+              <a:t> paint, programmers </a:t>
+            </a:r>
+            <a:r>
+              <a:rPr lang="en-US" dirty="0" err="1"/>
+              <a:t>gotta</a:t>
+            </a:r>
+            <a:r>
+              <a:rPr lang="en-US" dirty="0"/>
+              <a:t> program</a:t>
+            </a:r>
+          </a:p>
+          <a:p>
+            <a:r>
+              <a:rPr lang="en-US" dirty="0"/>
+              <a:t>The code:</a:t>
+            </a:r>
+          </a:p>
+          <a:p>
+            <a:pPr marL="457200" lvl="1" indent="0">
+              <a:buNone/>
+            </a:pPr>
+            <a:r>
+              <a:rPr lang="en-US" dirty="0"/>
+              <a:t>https://github/brucepay/braidlang</a:t>
+            </a:r>
+          </a:p>
+          <a:p>
+            <a:r>
+              <a:rPr lang="en-US" dirty="0"/>
+              <a:t>The talk + examples:</a:t>
+            </a:r>
+          </a:p>
+          <a:p>
+            <a:pPr lvl="1"/>
+            <a:r>
+              <a:rPr lang="en-US" dirty="0"/>
+              <a:t>https://github/brucepay/PSConfEU2024</a:t>
+            </a:r>
+          </a:p>
+        </p:txBody>
+      </p:sp>
+    </p:spTree>
+    <p:extLst>
+      <p:ext uri="{BB962C8B-B14F-4D97-AF65-F5344CB8AC3E}">
+        <p14:creationId xmlns:p14="http://schemas.microsoft.com/office/powerpoint/2010/main" val="428041955"/>
+      </p:ext>
+    </p:extLst>
+  </p:cSld>
+  <p:clrMapOvr>
+    <a:masterClrMapping/>
+  </p:clrMapOvr>
+</p:sld>
+</file>
+
+<file path=ppt/slides/slide17.xml><?xml version="1.0" encoding="utf-8"?>
 <p:sld xmlns:a="http://schemas.openxmlformats.org/drawingml/2006/main" xmlns:r="http://schemas.openxmlformats.org/officeDocument/2006/relationships" xmlns:p="http://schemas.openxmlformats.org/presentationml/2006/main">
   <p:cSld>
     <p:spTree>
@@ -7364,14 +7956,14 @@
             <a:pPr lvl="1"/>
             <a:r>
               <a:rPr lang="en-US" dirty="0"/>
-              <a:t>Principal Software at AWS</a:t>
+              <a:t>Principal Software Engineer at AWS</a:t>
             </a:r>
           </a:p>
           <a:p>
             <a:pPr lvl="2"/>
             <a:r>
               <a:rPr lang="en-US" dirty="0"/>
-              <a:t>Also worked on PowerShell</a:t>
+              <a:t>Where I also worked on PowerShell</a:t>
             </a:r>
           </a:p>
           <a:p>
@@ -7568,22 +8160,9 @@
           <a:lstStyle/>
           <a:p>
             <a:r>
-              <a:rPr lang="fr-FR" dirty="0" err="1"/>
-              <a:t>Status</a:t>
-            </a:r>
-            <a:r>
-              <a:rPr lang="fr-FR" dirty="0"/>
-              <a:t> last </a:t>
-            </a:r>
-            <a:r>
-              <a:rPr lang="fr-FR" dirty="0" err="1"/>
-              <a:t>year</a:t>
-            </a:r>
-            <a:r>
-              <a:rPr lang="fr-FR" dirty="0"/>
-              <a:t>…</a:t>
-            </a:r>
-            <a:endParaRPr lang="en-GB" dirty="0"/>
+              <a:rPr lang="en-GB" sz="5400" i="1" dirty="0"/>
+              <a:t>Braid: a Post-PowerShell Shell</a:t>
+            </a:r>
           </a:p>
         </p:txBody>
       </p:sp>
@@ -7606,18 +8185,11 @@
         <p:spPr/>
         <p:txBody>
           <a:bodyPr>
-            <a:normAutofit lnSpcReduction="10000"/>
+            <a:normAutofit/>
           </a:bodyPr>
           <a:lstStyle/>
           <a:p>
             <a:r>
-              <a:rPr lang="en-GB" sz="5400" i="1" dirty="0"/>
-              <a:t>Braid: a Post-PowerShell Shell</a:t>
-            </a:r>
-          </a:p>
-          <a:p>
-            <a:pPr lvl="1"/>
-            <a:r>
               <a:rPr lang="en-US" dirty="0"/>
               <a:t>An Experiment in Shell Language Experiences</a:t>
             </a:r>
@@ -7634,6 +8206,13 @@
             </a:r>
           </a:p>
           <a:p>
+            <a:pPr lvl="1"/>
+            <a:r>
+              <a:rPr lang="en-US" dirty="0"/>
+              <a:t>Direct support for functional idioms</a:t>
+            </a:r>
+          </a:p>
+          <a:p>
             <a:r>
               <a:rPr lang="en-US" dirty="0"/>
               <a:t>A new shell language that builds on the themes pioneered by PowerShell</a:t>
@@ -7643,22 +8222,20 @@
             <a:pPr lvl="1"/>
             <a:r>
               <a:rPr lang="en-US" dirty="0"/>
-              <a:t>Object-oriented pipelines</a:t>
+              <a:t>Object-based pipelines</a:t>
             </a:r>
           </a:p>
           <a:p>
             <a:pPr lvl="1"/>
             <a:r>
               <a:rPr lang="en-US" dirty="0"/>
-              <a:t>“real” programmability</a:t>
-            </a:r>
-          </a:p>
-          <a:p>
-            <a:pPr lvl="1"/>
-            <a:r>
-              <a:rPr lang="en-US" dirty="0"/>
-              <a:t> direct support for functional idioms</a:t>
-            </a:r>
+              <a:t>“real</a:t>
+            </a:r>
+            <a:r>
+              <a:rPr lang="en-US"/>
+              <a:t>” programmability</a:t>
+            </a:r>
+            <a:endParaRPr lang="en-US" dirty="0"/>
           </a:p>
         </p:txBody>
       </p:sp>
@@ -7751,7 +8328,9 @@
         </p:nvSpPr>
         <p:spPr/>
         <p:txBody>
-          <a:bodyPr/>
+          <a:bodyPr>
+            <a:normAutofit lnSpcReduction="10000"/>
+          </a:bodyPr>
           <a:lstStyle/>
           <a:p>
             <a:r>
@@ -7793,7 +8372,7 @@
           <a:p>
             <a:r>
               <a:rPr lang="en-US" dirty="0"/>
-              <a:t>Only builds with .NET desktop</a:t>
+              <a:t>Only builds with .NET desktop (but it runs everywhere)</a:t>
             </a:r>
           </a:p>
           <a:p>

</xml_diff>